<commit_message>
Update lecture slides and assignment.
</commit_message>
<xml_diff>
--- a/CPSC-24500/Week01/2016SpringW01SlidesLecture.pptx
+++ b/CPSC-24500/Week01/2016SpringW01SlidesLecture.pptx
@@ -5,7 +5,7 @@
     <p:sldMasterId id="2147483648" r:id="rId4"/>
   </p:sldMasterIdLst>
   <p:notesMasterIdLst>
-    <p:notesMasterId r:id="rId38"/>
+    <p:notesMasterId r:id="rId39"/>
   </p:notesMasterIdLst>
   <p:sldIdLst>
     <p:sldId id="330" r:id="rId5"/>
@@ -41,6 +41,7 @@
     <p:sldId id="322" r:id="rId35"/>
     <p:sldId id="324" r:id="rId36"/>
     <p:sldId id="339" r:id="rId37"/>
+    <p:sldId id="351" r:id="rId38"/>
   </p:sldIdLst>
   <p:sldSz cx="12192000" cy="6858000"/>
   <p:notesSz cx="7315200" cy="9601200"/>
@@ -3683,7 +3684,92 @@
           <a:bodyPr/>
           <a:lstStyle/>
           <a:p>
+            <a:r>
+              <a:rPr lang="en-US" sz="1000" dirty="0"/>
+              <a:t>It (mostly) doesn’t matter if all you are doing is setting (or getting) the values.</a:t>
+            </a:r>
+          </a:p>
+          <a:p>
             <a:endParaRPr lang="en-US" sz="1000" dirty="0"/>
+          </a:p>
+          <a:p>
+            <a:r>
+              <a:rPr lang="en-US" sz="1000" dirty="0"/>
+              <a:t>Why use Setters &amp; Getters?</a:t>
+            </a:r>
+          </a:p>
+          <a:p>
+            <a:pPr marL="171450" indent="-171450">
+              <a:buFont typeface="Arial" panose="020B0604020202020204" pitchFamily="34" charset="0"/>
+              <a:buChar char="•"/>
+            </a:pPr>
+            <a:r>
+              <a:rPr lang="en-US" sz="1000" dirty="0"/>
+              <a:t>Because 2 weeks (months, years) from now when you realize that your setter needs to do more than just set the value, you'll also realize that the property has been used directly in 238 other classes.</a:t>
+            </a:r>
+          </a:p>
+          <a:p>
+            <a:pPr marL="171450" marR="0" lvl="0" indent="-171450" algn="l" defTabSz="914400" rtl="0" eaLnBrk="1" fontAlgn="auto" latinLnBrk="0" hangingPunct="1">
+              <a:lnSpc>
+                <a:spcPct val="100000"/>
+              </a:lnSpc>
+              <a:spcBef>
+                <a:spcPts val="0"/>
+              </a:spcBef>
+              <a:spcAft>
+                <a:spcPts val="0"/>
+              </a:spcAft>
+              <a:buClrTx/>
+              <a:buSzTx/>
+              <a:buFont typeface="Arial" panose="020B0604020202020204" pitchFamily="34" charset="0"/>
+              <a:buChar char="•"/>
+              <a:tabLst/>
+              <a:defRPr/>
+            </a:pPr>
+            <a:r>
+              <a:rPr lang="en-US" sz="1000" dirty="0"/>
+              <a:t>Validation</a:t>
+            </a:r>
+          </a:p>
+          <a:p>
+            <a:pPr marL="171450" indent="-171450">
+              <a:buFont typeface="Arial" panose="020B0604020202020204" pitchFamily="34" charset="0"/>
+              <a:buChar char="•"/>
+            </a:pPr>
+            <a:r>
+              <a:rPr lang="en-US" sz="1000" dirty="0"/>
+              <a:t>Optimization</a:t>
+            </a:r>
+          </a:p>
+          <a:p>
+            <a:pPr marL="171450" indent="-171450">
+              <a:buFont typeface="Arial" panose="020B0604020202020204" pitchFamily="34" charset="0"/>
+              <a:buChar char="•"/>
+            </a:pPr>
+            <a:r>
+              <a:rPr lang="en-US" sz="1000" dirty="0"/>
+              <a:t>Change the values (English to metric)</a:t>
+            </a:r>
+          </a:p>
+          <a:p>
+            <a:pPr marL="171450" indent="-171450">
+              <a:buFont typeface="Arial" panose="020B0604020202020204" pitchFamily="34" charset="0"/>
+              <a:buChar char="•"/>
+            </a:pPr>
+            <a:r>
+              <a:rPr lang="en-US" sz="1000" dirty="0"/>
+              <a:t>Debugging breakpoint</a:t>
+            </a:r>
+          </a:p>
+          <a:p>
+            <a:pPr marL="171450" indent="-171450">
+              <a:buFont typeface="Arial" panose="020B0604020202020204" pitchFamily="34" charset="0"/>
+              <a:buChar char="•"/>
+            </a:pPr>
+            <a:r>
+              <a:rPr lang="en-US" sz="1000" dirty="0"/>
+              <a:t>Some libraries expect this</a:t>
+            </a:r>
           </a:p>
         </p:txBody>
       </p:sp>
@@ -3714,6 +3800,164 @@
     <p:extLst>
       <p:ext uri="{BB962C8B-B14F-4D97-AF65-F5344CB8AC3E}">
         <p14:creationId xmlns:p14="http://schemas.microsoft.com/office/powerpoint/2010/main" val="1908608686"/>
+      </p:ext>
+    </p:extLst>
+  </p:cSld>
+  <p:clrMapOvr>
+    <a:masterClrMapping/>
+  </p:clrMapOvr>
+</p:notes>
+</file>
+
+<file path=ppt/notesSlides/notesSlide34.xml><?xml version="1.0" encoding="utf-8"?>
+<p:notes xmlns:a="http://schemas.openxmlformats.org/drawingml/2006/main" xmlns:r="http://schemas.openxmlformats.org/officeDocument/2006/relationships" xmlns:p="http://schemas.openxmlformats.org/presentationml/2006/main">
+  <p:cSld>
+    <p:spTree>
+      <p:nvGrpSpPr>
+        <p:cNvPr id="1" name=""/>
+        <p:cNvGrpSpPr/>
+        <p:nvPr/>
+      </p:nvGrpSpPr>
+      <p:grpSpPr>
+        <a:xfrm>
+          <a:off x="0" y="0"/>
+          <a:ext cx="0" cy="0"/>
+          <a:chOff x="0" y="0"/>
+          <a:chExt cx="0" cy="0"/>
+        </a:xfrm>
+      </p:grpSpPr>
+      <p:sp>
+        <p:nvSpPr>
+          <p:cNvPr id="2" name="Slide Image Placeholder 1"/>
+          <p:cNvSpPr>
+            <a:spLocks noGrp="1" noRot="1" noChangeAspect="1"/>
+          </p:cNvSpPr>
+          <p:nvPr>
+            <p:ph type="sldImg"/>
+          </p:nvPr>
+        </p:nvSpPr>
+        <p:spPr/>
+      </p:sp>
+      <p:sp>
+        <p:nvSpPr>
+          <p:cNvPr id="3" name="Notes Placeholder 2"/>
+          <p:cNvSpPr>
+            <a:spLocks noGrp="1"/>
+          </p:cNvSpPr>
+          <p:nvPr>
+            <p:ph type="body" idx="1"/>
+          </p:nvPr>
+        </p:nvSpPr>
+        <p:spPr/>
+        <p:txBody>
+          <a:bodyPr/>
+          <a:lstStyle/>
+          <a:p>
+            <a:r>
+              <a:rPr lang="en-US" sz="1000" dirty="0"/>
+              <a:t>Get this set up for yourself this week by compiling and running “HelloWorld”.</a:t>
+            </a:r>
+          </a:p>
+          <a:p>
+            <a:endParaRPr lang="en-US" sz="1000" dirty="0"/>
+          </a:p>
+          <a:p>
+            <a:r>
+              <a:rPr lang="en-US" sz="1000" dirty="0"/>
+              <a:t>I will be using the Microsoft Code Editor and the command link Java JDK to review and grade your assignments. Make CERTAIN that the assignments you submit compile an run in these environments. Lets start by submitting a single .java file for at least the first two weeks. Then we will consider extending our practices. </a:t>
+            </a:r>
+          </a:p>
+          <a:p>
+            <a:endParaRPr lang="en-US" sz="1000" dirty="0"/>
+          </a:p>
+          <a:p>
+            <a:r>
+              <a:rPr lang="en-US" sz="1000" dirty="0"/>
+              <a:t>I will be compiling your applications with the standard </a:t>
+            </a:r>
+            <a:r>
+              <a:rPr lang="en-US" sz="1000" dirty="0" err="1"/>
+              <a:t>javac</a:t>
+            </a:r>
+            <a:r>
+              <a:rPr lang="en-US" sz="1000" dirty="0"/>
+              <a:t> and java command line tools. For example, if you submitted a file named “ShapesApp.java”, I would expect:</a:t>
+            </a:r>
+          </a:p>
+          <a:p>
+            <a:r>
+              <a:rPr lang="en-US" sz="1000" dirty="0"/>
+              <a:t>To compile  it with the command “</a:t>
+            </a:r>
+            <a:r>
+              <a:rPr lang="en-US" sz="1000" dirty="0" err="1"/>
+              <a:t>javac</a:t>
+            </a:r>
+            <a:r>
+              <a:rPr lang="en-US" sz="1000" dirty="0"/>
+              <a:t> .\ShapesApp.java”</a:t>
+            </a:r>
+          </a:p>
+          <a:p>
+            <a:r>
+              <a:rPr lang="en-US" sz="1000" dirty="0"/>
+              <a:t>To run it with the command “java -</a:t>
+            </a:r>
+            <a:r>
+              <a:rPr lang="en-US" sz="1000" dirty="0" err="1"/>
+              <a:t>cp</a:t>
+            </a:r>
+            <a:r>
+              <a:rPr lang="en-US" sz="1000" dirty="0"/>
+              <a:t> . </a:t>
+            </a:r>
+            <a:r>
+              <a:rPr lang="en-US" sz="1000" dirty="0" err="1"/>
+              <a:t>ShapesApp</a:t>
+            </a:r>
+            <a:r>
+              <a:rPr lang="en-US" sz="1000" dirty="0"/>
+              <a:t>”</a:t>
+            </a:r>
+          </a:p>
+          <a:p>
+            <a:endParaRPr lang="en-US" sz="1000" dirty="0"/>
+          </a:p>
+          <a:p>
+            <a:r>
+              <a:rPr lang="en-US" sz="1000" dirty="0"/>
+              <a:t>You should test all assignments using this configuration BEFORE you turn them in for review and grading. </a:t>
+            </a:r>
+          </a:p>
+        </p:txBody>
+      </p:sp>
+      <p:sp>
+        <p:nvSpPr>
+          <p:cNvPr id="4" name="Slide Number Placeholder 3"/>
+          <p:cNvSpPr>
+            <a:spLocks noGrp="1"/>
+          </p:cNvSpPr>
+          <p:nvPr>
+            <p:ph type="sldNum" sz="quarter" idx="10"/>
+          </p:nvPr>
+        </p:nvSpPr>
+        <p:spPr/>
+        <p:txBody>
+          <a:bodyPr/>
+          <a:lstStyle/>
+          <a:p>
+            <a:fld id="{5394DE12-7B9B-46AA-AC19-C30A49928B9B}" type="slidenum">
+              <a:rPr lang="en-US" smtClean="0"/>
+              <a:t>34</a:t>
+            </a:fld>
+            <a:endParaRPr lang="en-US"/>
+          </a:p>
+        </p:txBody>
+      </p:sp>
+    </p:spTree>
+    <p:extLst>
+      <p:ext uri="{BB962C8B-B14F-4D97-AF65-F5344CB8AC3E}">
+        <p14:creationId xmlns:p14="http://schemas.microsoft.com/office/powerpoint/2010/main" val="7173753"/>
       </p:ext>
     </p:extLst>
   </p:cSld>
@@ -11688,20 +11932,15 @@
             <a:pPr lvl="1"/>
             <a:r>
               <a:rPr lang="en-US" sz="2800" dirty="0"/>
-              <a:t>Getters &amp; Setters</a:t>
+              <a:t>Setters &amp; Getters</a:t>
             </a:r>
           </a:p>
           <a:p>
             <a:pPr lvl="1"/>
             <a:r>
               <a:rPr lang="en-US" sz="2800" dirty="0"/>
-              <a:t>Java </a:t>
-            </a:r>
-            <a:r>
-              <a:rPr lang="en-US" sz="2800"/>
-              <a:t>Development Environment</a:t>
-            </a:r>
-            <a:endParaRPr lang="en-US" sz="2800" dirty="0"/>
+              <a:t>Java Development Environment Overview</a:t>
+            </a:r>
           </a:p>
           <a:p>
             <a:pPr marL="514350" indent="-514350">
@@ -15134,7 +15373,6 @@
               <a:rPr lang="en-US" sz="2000" dirty="0"/>
               <a:t>Although it can be difficult to learn at first, you will eventually find that object-oriented programming techniques will greatly expand what you can do as a software developer. By the end of this course, I think you will be quite proud of how much you can implement as a software developer. My job is to help you get to that point.</a:t>
             </a:r>
-            <a:endParaRPr lang="en-US" sz="2000" dirty="0"/>
           </a:p>
         </p:txBody>
       </p:sp>
@@ -16111,6 +16349,30 @@
           <a:chExt cx="0" cy="0"/>
         </a:xfrm>
       </p:grpSpPr>
+      <p:pic>
+        <p:nvPicPr>
+          <p:cNvPr id="5" name="Picture 4"/>
+          <p:cNvPicPr>
+            <a:picLocks noChangeAspect="1"/>
+          </p:cNvPicPr>
+          <p:nvPr/>
+        </p:nvPicPr>
+        <p:blipFill>
+          <a:blip r:embed="rId3"/>
+          <a:stretch>
+            <a:fillRect/>
+          </a:stretch>
+        </p:blipFill>
+        <p:spPr>
+          <a:xfrm>
+            <a:off x="5937953" y="1354577"/>
+            <a:ext cx="4114800" cy="4234608"/>
+          </a:xfrm>
+          <a:prstGeom prst="rect">
+            <a:avLst/>
+          </a:prstGeom>
+        </p:spPr>
+      </p:pic>
       <p:sp>
         <p:nvSpPr>
           <p:cNvPr id="9" name="Content Placeholder 2"/>
@@ -16303,7 +16565,7 @@
             </a:pPr>
             <a:r>
               <a:rPr lang="en-US" sz="1600" u="sng" dirty="0"/>
-              <a:t>Object -Oriented BMI:</a:t>
+              <a:t>Rectangle:</a:t>
             </a:r>
           </a:p>
           <a:p>
@@ -16339,35 +16601,11 @@
           <a:p>
             <a:r>
               <a:rPr lang="en-US" sz="3600" dirty="0"/>
-              <a:t>Encapsulation… and Getters &amp; Setters</a:t>
-            </a:r>
-          </a:p>
-        </p:txBody>
-      </p:sp>
-      <p:pic>
-        <p:nvPicPr>
-          <p:cNvPr id="6" name="Picture 5"/>
-          <p:cNvPicPr>
-            <a:picLocks noChangeAspect="1"/>
-          </p:cNvPicPr>
-          <p:nvPr/>
-        </p:nvPicPr>
-        <p:blipFill>
-          <a:blip r:embed="rId3"/>
-          <a:stretch>
-            <a:fillRect/>
-          </a:stretch>
-        </p:blipFill>
-        <p:spPr>
-          <a:xfrm>
-            <a:off x="933120" y="1354577"/>
-            <a:ext cx="4114800" cy="3904314"/>
-          </a:xfrm>
-          <a:prstGeom prst="rect">
-            <a:avLst/>
-          </a:prstGeom>
-        </p:spPr>
-      </p:pic>
+              <a:t>Encapsulation… and Setters &amp; Getters</a:t>
+            </a:r>
+          </a:p>
+        </p:txBody>
+      </p:sp>
       <p:sp>
         <p:nvSpPr>
           <p:cNvPr id="10" name="Content Placeholder 2"/>
@@ -16560,7 +16798,7 @@
             </a:pPr>
             <a:r>
               <a:rPr lang="en-US" sz="1600" u="sng" dirty="0"/>
-              <a:t>Encapsulated Object-Oriented BMI:</a:t>
+              <a:t>Rectangle with Setters:</a:t>
             </a:r>
           </a:p>
           <a:p>
@@ -16574,7 +16812,7 @@
       </p:sp>
       <p:pic>
         <p:nvPicPr>
-          <p:cNvPr id="11" name="Picture 10"/>
+          <p:cNvPr id="4" name="Picture 3"/>
           <p:cNvPicPr>
             <a:picLocks noChangeAspect="1"/>
           </p:cNvPicPr>
@@ -16588,8 +16826,8 @@
         </p:blipFill>
         <p:spPr>
           <a:xfrm>
-            <a:off x="5937953" y="1354578"/>
-            <a:ext cx="4114800" cy="3394503"/>
+            <a:off x="929024" y="1354577"/>
+            <a:ext cx="4114800" cy="3216876"/>
           </a:xfrm>
           <a:prstGeom prst="rect">
             <a:avLst/>
@@ -16600,6 +16838,253 @@
     <p:extLst>
       <p:ext uri="{BB962C8B-B14F-4D97-AF65-F5344CB8AC3E}">
         <p14:creationId xmlns:p14="http://schemas.microsoft.com/office/powerpoint/2010/main" val="461484499"/>
+      </p:ext>
+    </p:extLst>
+  </p:cSld>
+  <p:clrMapOvr>
+    <a:masterClrMapping/>
+  </p:clrMapOvr>
+</p:sld>
+</file>
+
+<file path=ppt/slides/slide34.xml><?xml version="1.0" encoding="utf-8"?>
+<p:sld xmlns:a="http://schemas.openxmlformats.org/drawingml/2006/main" xmlns:r="http://schemas.openxmlformats.org/officeDocument/2006/relationships" xmlns:p="http://schemas.openxmlformats.org/presentationml/2006/main">
+  <p:cSld>
+    <p:spTree>
+      <p:nvGrpSpPr>
+        <p:cNvPr id="1" name=""/>
+        <p:cNvGrpSpPr/>
+        <p:nvPr/>
+      </p:nvGrpSpPr>
+      <p:grpSpPr>
+        <a:xfrm>
+          <a:off x="0" y="0"/>
+          <a:ext cx="0" cy="0"/>
+          <a:chOff x="0" y="0"/>
+          <a:chExt cx="0" cy="0"/>
+        </a:xfrm>
+      </p:grpSpPr>
+      <p:sp>
+        <p:nvSpPr>
+          <p:cNvPr id="2" name="Title 1"/>
+          <p:cNvSpPr>
+            <a:spLocks noGrp="1"/>
+          </p:cNvSpPr>
+          <p:nvPr>
+            <p:ph type="title"/>
+          </p:nvPr>
+        </p:nvSpPr>
+        <p:spPr>
+          <a:xfrm>
+            <a:off x="811620" y="365126"/>
+            <a:ext cx="10515600" cy="757272"/>
+          </a:xfrm>
+        </p:spPr>
+        <p:txBody>
+          <a:bodyPr>
+            <a:normAutofit/>
+          </a:bodyPr>
+          <a:lstStyle/>
+          <a:p>
+            <a:r>
+              <a:rPr lang="en-US" sz="3600" dirty="0"/>
+              <a:t>Ja</a:t>
+            </a:r>
+            <a:r>
+              <a:rPr lang="en-US" sz="3600" dirty="0"/>
+              <a:t>v</a:t>
+            </a:r>
+            <a:r>
+              <a:rPr lang="en-US" sz="3600" dirty="0"/>
+              <a:t>a Development Environment Overview</a:t>
+            </a:r>
+          </a:p>
+        </p:txBody>
+      </p:sp>
+      <p:sp>
+        <p:nvSpPr>
+          <p:cNvPr id="7" name="Content Placeholder 2"/>
+          <p:cNvSpPr>
+            <a:spLocks noGrp="1"/>
+          </p:cNvSpPr>
+          <p:nvPr>
+            <p:ph idx="1"/>
+          </p:nvPr>
+        </p:nvSpPr>
+        <p:spPr>
+          <a:xfrm>
+            <a:off x="811620" y="1389690"/>
+            <a:ext cx="5488171" cy="4208352"/>
+          </a:xfrm>
+        </p:spPr>
+        <p:txBody>
+          <a:bodyPr>
+            <a:normAutofit/>
+          </a:bodyPr>
+          <a:lstStyle/>
+          <a:p>
+            <a:pPr marL="0" indent="0">
+              <a:buNone/>
+            </a:pPr>
+            <a:r>
+              <a:rPr lang="en-US" sz="2000" u="sng" dirty="0"/>
+              <a:t>Standard Java tools for this class include:</a:t>
+            </a:r>
+          </a:p>
+          <a:p>
+            <a:pPr>
+              <a:buFont typeface="Wingdings" panose="05000000000000000000" pitchFamily="2" charset="2"/>
+              <a:buChar char="§"/>
+            </a:pPr>
+            <a:r>
+              <a:rPr lang="en-US" sz="2000" dirty="0"/>
+              <a:t>Java SE Development Kit (</a:t>
+            </a:r>
+            <a:r>
+              <a:rPr lang="en-US" sz="2000" dirty="0"/>
+              <a:t>SDK) </a:t>
+            </a:r>
+            <a:r>
+              <a:rPr lang="en-US" sz="2000" dirty="0"/>
+              <a:t>8 from Oracle</a:t>
+            </a:r>
+          </a:p>
+          <a:p>
+            <a:pPr>
+              <a:buFont typeface="Wingdings" panose="05000000000000000000" pitchFamily="2" charset="2"/>
+              <a:buChar char="§"/>
+            </a:pPr>
+            <a:r>
+              <a:rPr lang="en-US" sz="2000" dirty="0"/>
+              <a:t>Text Editor</a:t>
+            </a:r>
+          </a:p>
+          <a:p>
+            <a:pPr>
+              <a:buFont typeface="Wingdings" panose="05000000000000000000" pitchFamily="2" charset="2"/>
+              <a:buChar char="§"/>
+            </a:pPr>
+            <a:endParaRPr lang="en-US" sz="2000" dirty="0"/>
+          </a:p>
+          <a:p>
+            <a:pPr marL="0" indent="0">
+              <a:buNone/>
+            </a:pPr>
+            <a:r>
+              <a:rPr lang="en-US" sz="2000" u="sng" dirty="0"/>
+              <a:t>Optional Tools:</a:t>
+            </a:r>
+          </a:p>
+          <a:p>
+            <a:pPr>
+              <a:buFont typeface="Wingdings" panose="05000000000000000000" pitchFamily="2" charset="2"/>
+              <a:buChar char="§"/>
+            </a:pPr>
+            <a:r>
+              <a:rPr lang="en-US" sz="2000" dirty="0" err="1"/>
+              <a:t>Git</a:t>
+            </a:r>
+            <a:r>
+              <a:rPr lang="en-US" sz="2000" dirty="0"/>
+              <a:t> and GitHub… let me know if you are interested in piloting this (highly recommended)</a:t>
+            </a:r>
+          </a:p>
+          <a:p>
+            <a:pPr>
+              <a:buFont typeface="Wingdings" panose="05000000000000000000" pitchFamily="2" charset="2"/>
+              <a:buChar char="§"/>
+            </a:pPr>
+            <a:r>
+              <a:rPr lang="en-US" sz="2000" dirty="0"/>
+              <a:t>Eclipse</a:t>
+            </a:r>
+          </a:p>
+          <a:p>
+            <a:pPr>
+              <a:buFont typeface="Wingdings" panose="05000000000000000000" pitchFamily="2" charset="2"/>
+              <a:buChar char="§"/>
+            </a:pPr>
+            <a:r>
+              <a:rPr lang="en-US" sz="2000" dirty="0"/>
+              <a:t>You are welcome to use addition tools, but please don’t make your assignments dependent on those tools.</a:t>
+            </a:r>
+          </a:p>
+          <a:p>
+            <a:pPr marL="0" indent="0">
+              <a:buNone/>
+            </a:pPr>
+            <a:endParaRPr lang="en-US" sz="2000" dirty="0"/>
+          </a:p>
+        </p:txBody>
+      </p:sp>
+      <p:pic>
+        <p:nvPicPr>
+          <p:cNvPr id="3" name="Picture 2"/>
+          <p:cNvPicPr>
+            <a:picLocks noChangeAspect="1"/>
+          </p:cNvPicPr>
+          <p:nvPr/>
+        </p:nvPicPr>
+        <p:blipFill>
+          <a:blip r:embed="rId3"/>
+          <a:stretch>
+            <a:fillRect/>
+          </a:stretch>
+        </p:blipFill>
+        <p:spPr>
+          <a:xfrm>
+            <a:off x="6680792" y="1389690"/>
+            <a:ext cx="4114800" cy="4089892"/>
+          </a:xfrm>
+          <a:prstGeom prst="rect">
+            <a:avLst/>
+          </a:prstGeom>
+        </p:spPr>
+      </p:pic>
+      <p:sp>
+        <p:nvSpPr>
+          <p:cNvPr id="6" name="Arrow: Right 5"/>
+          <p:cNvSpPr/>
+          <p:nvPr/>
+        </p:nvSpPr>
+        <p:spPr>
+          <a:xfrm>
+            <a:off x="5900188" y="1796902"/>
+            <a:ext cx="510363" cy="366823"/>
+          </a:xfrm>
+          <a:prstGeom prst="rightArrow">
+            <a:avLst/>
+          </a:prstGeom>
+        </p:spPr>
+        <p:style>
+          <a:lnRef idx="2">
+            <a:schemeClr val="accent1">
+              <a:shade val="50000"/>
+            </a:schemeClr>
+          </a:lnRef>
+          <a:fillRef idx="1">
+            <a:schemeClr val="accent1"/>
+          </a:fillRef>
+          <a:effectRef idx="0">
+            <a:schemeClr val="accent1"/>
+          </a:effectRef>
+          <a:fontRef idx="minor">
+            <a:schemeClr val="lt1"/>
+          </a:fontRef>
+        </p:style>
+        <p:txBody>
+          <a:bodyPr rtlCol="0" anchor="ctr"/>
+          <a:lstStyle/>
+          <a:p>
+            <a:pPr algn="ctr"/>
+            <a:endParaRPr lang="en-US"/>
+          </a:p>
+        </p:txBody>
+      </p:sp>
+    </p:spTree>
+    <p:extLst>
+      <p:ext uri="{BB962C8B-B14F-4D97-AF65-F5344CB8AC3E}">
+        <p14:creationId xmlns:p14="http://schemas.microsoft.com/office/powerpoint/2010/main" val="578627844"/>
       </p:ext>
     </p:extLst>
   </p:cSld>
@@ -16758,7 +17243,6 @@
               <a:rPr lang="en-US" dirty="0"/>
               <a:t>I’m looking forward to getting to know each of you, and I sincerely hope you will enjoy taking this class as much as I know that I will enjoy teaching it.</a:t>
             </a:r>
-            <a:endParaRPr lang="en-US" dirty="0"/>
           </a:p>
         </p:txBody>
       </p:sp>
@@ -18559,21 +19043,6 @@
 </file>
 
 <file path=customXml/item1.xml><?xml version="1.0" encoding="utf-8"?>
-<?mso-contentType ?>
-<FormTemplates xmlns="http://schemas.microsoft.com/sharepoint/v3/contenttype/forms">
-  <Display>DocumentLibraryForm</Display>
-  <Edit>DocumentLibraryForm</Edit>
-  <New>DocumentLibraryForm</New>
-</FormTemplates>
-</file>
-
-<file path=customXml/item2.xml><?xml version="1.0" encoding="utf-8"?>
-<p:properties xmlns:p="http://schemas.microsoft.com/office/2006/metadata/properties" xmlns:xsi="http://www.w3.org/2001/XMLSchema-instance" xmlns:pc="http://schemas.microsoft.com/office/infopath/2007/PartnerControls">
-  <documentManagement/>
-</p:properties>
-</file>
-
-<file path=customXml/item3.xml><?xml version="1.0" encoding="utf-8"?>
 <ct:contentTypeSchema xmlns:ct="http://schemas.microsoft.com/office/2006/metadata/contentType" xmlns:ma="http://schemas.microsoft.com/office/2006/metadata/properties/metaAttributes" ct:_="" ma:_="" ma:contentTypeName="Document" ma:contentTypeID="0x0101004E7FF26E314236448B954F3A97640002" ma:contentTypeVersion="0" ma:contentTypeDescription="Create a new document." ma:contentTypeScope="" ma:versionID="dcd134f7ef3b1aa8a267b1d1a9f0b332">
   <xsd:schema xmlns:xsd="http://www.w3.org/2001/XMLSchema" xmlns:xs="http://www.w3.org/2001/XMLSchema" xmlns:p="http://schemas.microsoft.com/office/2006/metadata/properties" targetNamespace="http://schemas.microsoft.com/office/2006/metadata/properties" ma:root="true" ma:fieldsID="fad425956ca267ea5e6d723b3f3bd6f1">
     <xsd:element name="properties">
@@ -18687,30 +19156,22 @@
 </ct:contentTypeSchema>
 </file>
 
-<file path=customXml/itemProps1.xml><?xml version="1.0" encoding="utf-8"?>
-<ds:datastoreItem xmlns:ds="http://schemas.openxmlformats.org/officeDocument/2006/customXml" ds:itemID="{87FD8B20-B89A-4B23-9329-175195DD4D8A}">
-  <ds:schemaRefs>
-    <ds:schemaRef ds:uri="http://schemas.microsoft.com/sharepoint/v3/contenttype/forms"/>
-  </ds:schemaRefs>
-</ds:datastoreItem>
+<file path=customXml/item2.xml><?xml version="1.0" encoding="utf-8"?>
+<p:properties xmlns:p="http://schemas.microsoft.com/office/2006/metadata/properties" xmlns:xsi="http://www.w3.org/2001/XMLSchema-instance" xmlns:pc="http://schemas.microsoft.com/office/infopath/2007/PartnerControls">
+  <documentManagement/>
+</p:properties>
 </file>
 
-<file path=customXml/itemProps2.xml><?xml version="1.0" encoding="utf-8"?>
-<ds:datastoreItem xmlns:ds="http://schemas.openxmlformats.org/officeDocument/2006/customXml" ds:itemID="{3473EA1A-2744-48E8-B2A3-4F89C0FC849C}">
-  <ds:schemaRefs>
-    <ds:schemaRef ds:uri="http://purl.org/dc/elements/1.1/"/>
-    <ds:schemaRef ds:uri="http://schemas.microsoft.com/office/2006/metadata/properties"/>
-    <ds:schemaRef ds:uri="http://schemas.microsoft.com/office/2006/documentManagement/types"/>
-    <ds:schemaRef ds:uri="http://purl.org/dc/terms/"/>
-    <ds:schemaRef ds:uri="http://schemas.openxmlformats.org/package/2006/metadata/core-properties"/>
-    <ds:schemaRef ds:uri="http://purl.org/dc/dcmitype/"/>
-    <ds:schemaRef ds:uri="http://schemas.microsoft.com/office/infopath/2007/PartnerControls"/>
-    <ds:schemaRef ds:uri="http://www.w3.org/XML/1998/namespace"/>
-  </ds:schemaRefs>
-</ds:datastoreItem>
+<file path=customXml/item3.xml><?xml version="1.0" encoding="utf-8"?>
+<?mso-contentType ?>
+<FormTemplates xmlns="http://schemas.microsoft.com/sharepoint/v3/contenttype/forms">
+  <Display>DocumentLibraryForm</Display>
+  <Edit>DocumentLibraryForm</Edit>
+  <New>DocumentLibraryForm</New>
+</FormTemplates>
 </file>
 
-<file path=customXml/itemProps3.xml><?xml version="1.0" encoding="utf-8"?>
+<file path=customXml/itemProps1.xml><?xml version="1.0" encoding="utf-8"?>
 <ds:datastoreItem xmlns:ds="http://schemas.openxmlformats.org/officeDocument/2006/customXml" ds:itemID="{A906A71E-D2C6-4CAA-8E79-10C504BC5F58}">
   <ds:schemaRefs>
     <ds:schemaRef ds:uri="http://schemas.microsoft.com/office/2006/metadata/contentType"/>
@@ -18724,4 +19185,27 @@
     <ds:schemaRef ds:uri="http://schemas.microsoft.com/office/infopath/2007/PartnerControls"/>
   </ds:schemaRefs>
 </ds:datastoreItem>
+</file>
+
+<file path=customXml/itemProps2.xml><?xml version="1.0" encoding="utf-8"?>
+<ds:datastoreItem xmlns:ds="http://schemas.openxmlformats.org/officeDocument/2006/customXml" ds:itemID="{3473EA1A-2744-48E8-B2A3-4F89C0FC849C}">
+  <ds:schemaRefs>
+    <ds:schemaRef ds:uri="http://purl.org/dc/terms/"/>
+    <ds:schemaRef ds:uri="http://schemas.openxmlformats.org/package/2006/metadata/core-properties"/>
+    <ds:schemaRef ds:uri="http://purl.org/dc/dcmitype/"/>
+    <ds:schemaRef ds:uri="http://schemas.microsoft.com/office/infopath/2007/PartnerControls"/>
+    <ds:schemaRef ds:uri="http://purl.org/dc/elements/1.1/"/>
+    <ds:schemaRef ds:uri="http://schemas.microsoft.com/office/2006/documentManagement/types"/>
+    <ds:schemaRef ds:uri="http://schemas.microsoft.com/office/2006/metadata/properties"/>
+    <ds:schemaRef ds:uri="http://www.w3.org/XML/1998/namespace"/>
+  </ds:schemaRefs>
+</ds:datastoreItem>
+</file>
+
+<file path=customXml/itemProps3.xml><?xml version="1.0" encoding="utf-8"?>
+<ds:datastoreItem xmlns:ds="http://schemas.openxmlformats.org/officeDocument/2006/customXml" ds:itemID="{87FD8B20-B89A-4B23-9329-175195DD4D8A}">
+  <ds:schemaRefs>
+    <ds:schemaRef ds:uri="http://schemas.microsoft.com/sharepoint/v3/contenttype/forms"/>
+  </ds:schemaRefs>
+</ds:datastoreItem>
 </file>
</xml_diff>